<commit_message>
updated powerpoint bitchez <3
</commit_message>
<xml_diff>
--- a/final_release/presentations/estpowerpoint.pptx
+++ b/final_release/presentations/estpowerpoint.pptx
@@ -5,7 +5,7 @@
     <p:sldMasterId id="2147483648" r:id="rId1"/>
   </p:sldMasterIdLst>
   <p:notesMasterIdLst>
-    <p:notesMasterId r:id="rId10"/>
+    <p:notesMasterId r:id="rId11"/>
   </p:notesMasterIdLst>
   <p:sldIdLst>
     <p:sldId id="256" r:id="rId2"/>
@@ -14,8 +14,9 @@
     <p:sldId id="259" r:id="rId5"/>
     <p:sldId id="260" r:id="rId6"/>
     <p:sldId id="261" r:id="rId7"/>
-    <p:sldId id="262" r:id="rId8"/>
-    <p:sldId id="263" r:id="rId9"/>
+    <p:sldId id="264" r:id="rId8"/>
+    <p:sldId id="262" r:id="rId9"/>
+    <p:sldId id="263" r:id="rId10"/>
   </p:sldIdLst>
   <p:sldSz cx="9144000" cy="6858000" type="screen4x3"/>
   <p:notesSz cx="6858000" cy="9144000"/>
@@ -5997,6 +5998,112 @@
           <a:p>
             <a:r>
               <a:rPr lang="en-US" dirty="0" smtClean="0"/>
+              <a:t>From either clicking “New Event” from the drop down commands or by doubling clicking on a empty day adds a New Event</a:t>
+            </a:r>
+            <a:endParaRPr lang="en-US" dirty="0"/>
+          </a:p>
+        </p:txBody>
+      </p:sp>
+      <p:sp>
+        <p:nvSpPr>
+          <p:cNvPr id="4" name="Title 3"/>
+          <p:cNvSpPr>
+            <a:spLocks noGrp="1"/>
+          </p:cNvSpPr>
+          <p:nvPr>
+            <p:ph type="title"/>
+          </p:nvPr>
+        </p:nvSpPr>
+        <p:spPr/>
+        <p:txBody>
+          <a:bodyPr/>
+          <a:lstStyle/>
+          <a:p>
+            <a:r>
+              <a:rPr lang="en-US" dirty="0" smtClean="0"/>
+              <a:t>FUNCTIONS OF OUR WEBSITE</a:t>
+            </a:r>
+            <a:endParaRPr lang="en-US" dirty="0"/>
+          </a:p>
+        </p:txBody>
+      </p:sp>
+      <p:pic>
+        <p:nvPicPr>
+          <p:cNvPr id="7" name="Content Placeholder 6" descr="add new event.PNG"/>
+          <p:cNvPicPr>
+            <a:picLocks noGrp="1" noChangeAspect="1"/>
+          </p:cNvPicPr>
+          <p:nvPr>
+            <p:ph sz="half" idx="2"/>
+          </p:nvPr>
+        </p:nvPicPr>
+        <p:blipFill>
+          <a:blip r:embed="rId2" cstate="print">
+            <a:extLst>
+              <a:ext uri="{28A0092B-C50C-407E-A947-70E740481C1C}">
+                <a14:useLocalDpi xmlns:a14="http://schemas.microsoft.com/office/drawing/2010/main" val="0"/>
+              </a:ext>
+            </a:extLst>
+          </a:blip>
+          <a:srcRect t="-68052" b="-68052"/>
+          <a:stretch>
+            <a:fillRect/>
+          </a:stretch>
+        </p:blipFill>
+        <p:spPr>
+          <a:xfrm>
+            <a:off x="4023360" y="217594"/>
+            <a:ext cx="4834890" cy="3713162"/>
+          </a:xfrm>
+        </p:spPr>
+      </p:pic>
+    </p:spTree>
+    <p:extLst>
+      <p:ext uri="{BB962C8B-B14F-4D97-AF65-F5344CB8AC3E}">
+        <p14:creationId xmlns:p14="http://schemas.microsoft.com/office/powerpoint/2010/main" val="2681381774"/>
+      </p:ext>
+    </p:extLst>
+  </p:cSld>
+  <p:clrMapOvr>
+    <a:masterClrMapping/>
+  </p:clrMapOvr>
+</p:sld>
+</file>
+
+<file path=ppt/slides/slide8.xml><?xml version="1.0" encoding="utf-8"?>
+<p:sld xmlns:a="http://schemas.openxmlformats.org/drawingml/2006/main" xmlns:r="http://schemas.openxmlformats.org/officeDocument/2006/relationships" xmlns:p="http://schemas.openxmlformats.org/presentationml/2006/main">
+  <p:cSld>
+    <p:spTree>
+      <p:nvGrpSpPr>
+        <p:cNvPr id="1" name=""/>
+        <p:cNvGrpSpPr/>
+        <p:nvPr/>
+      </p:nvGrpSpPr>
+      <p:grpSpPr>
+        <a:xfrm>
+          <a:off x="0" y="0"/>
+          <a:ext cx="0" cy="0"/>
+          <a:chOff x="0" y="0"/>
+          <a:chExt cx="0" cy="0"/>
+        </a:xfrm>
+      </p:grpSpPr>
+      <p:sp>
+        <p:nvSpPr>
+          <p:cNvPr id="2" name="Content Placeholder 1"/>
+          <p:cNvSpPr>
+            <a:spLocks noGrp="1"/>
+          </p:cNvSpPr>
+          <p:nvPr>
+            <p:ph sz="half" idx="1"/>
+          </p:nvPr>
+        </p:nvSpPr>
+        <p:spPr/>
+        <p:txBody>
+          <a:bodyPr/>
+          <a:lstStyle/>
+          <a:p>
+            <a:r>
+              <a:rPr lang="en-US" dirty="0" smtClean="0"/>
               <a:t>From the main page a user can then add a new event</a:t>
             </a:r>
             <a:endParaRPr lang="en-US" dirty="0"/>
@@ -6063,7 +6170,7 @@
 </p:sld>
 </file>
 
-<file path=ppt/slides/slide8.xml><?xml version="1.0" encoding="utf-8"?>
+<file path=ppt/slides/slide9.xml><?xml version="1.0" encoding="utf-8"?>
 <p:sld xmlns:a="http://schemas.openxmlformats.org/drawingml/2006/main" xmlns:r="http://schemas.openxmlformats.org/officeDocument/2006/relationships" xmlns:p="http://schemas.openxmlformats.org/presentationml/2006/main">
   <p:cSld>
     <p:spTree>

</xml_diff>